<commit_message>
Updated slides and exercises
</commit_message>
<xml_diff>
--- a/slides/Small_Genome_Assembly.pptx
+++ b/slides/Small_Genome_Assembly.pptx
@@ -14,6 +14,7 @@
   <p:sldIdLst>
     <p:sldId id="338" r:id="rId9"/>
     <p:sldId id="342" r:id="rId10"/>
+    <p:sldId id="343" r:id="rId11"/>
   </p:sldIdLst>
   <p:sldSz cx="9144000" cy="6858000" type="screen4x3"/>
   <p:notesSz cx="6858000" cy="9144000"/>
@@ -10974,6 +10975,283 @@
     <p:extLst>
       <p:ext uri="{BB962C8B-B14F-4D97-AF65-F5344CB8AC3E}">
         <p14:creationId xmlns:p14="http://schemas.microsoft.com/office/powerpoint/2010/main" val="4093853000"/>
+      </p:ext>
+    </p:extLst>
+  </p:cSld>
+  <p:clrMapOvr>
+    <a:masterClrMapping/>
+  </p:clrMapOvr>
+</p:sld>
+</file>
+
+<file path=ppt/slides/slide3.xml><?xml version="1.0" encoding="utf-8"?>
+<p:sld xmlns:a="http://schemas.openxmlformats.org/drawingml/2006/main" xmlns:r="http://schemas.openxmlformats.org/officeDocument/2006/relationships" xmlns:p="http://schemas.openxmlformats.org/presentationml/2006/main">
+  <p:cSld>
+    <p:spTree>
+      <p:nvGrpSpPr>
+        <p:cNvPr id="1" name=""/>
+        <p:cNvGrpSpPr/>
+        <p:nvPr/>
+      </p:nvGrpSpPr>
+      <p:grpSpPr>
+        <a:xfrm>
+          <a:off x="0" y="0"/>
+          <a:ext cx="0" cy="0"/>
+          <a:chOff x="0" y="0"/>
+          <a:chExt cx="0" cy="0"/>
+        </a:xfrm>
+      </p:grpSpPr>
+      <p:sp>
+        <p:nvSpPr>
+          <p:cNvPr id="5" name="Title 4"/>
+          <p:cNvSpPr>
+            <a:spLocks noGrp="1"/>
+          </p:cNvSpPr>
+          <p:nvPr>
+            <p:ph type="title"/>
+          </p:nvPr>
+        </p:nvSpPr>
+        <p:spPr/>
+        <p:txBody>
+          <a:bodyPr/>
+          <a:lstStyle/>
+          <a:p>
+            <a:r>
+              <a:rPr lang="en-US" dirty="0"/>
+              <a:t>G</a:t>
+            </a:r>
+            <a:r>
+              <a:rPr lang="en-US" dirty="0" smtClean="0"/>
+              <a:t>enome </a:t>
+            </a:r>
+            <a:r>
+              <a:rPr lang="en-US" dirty="0" smtClean="0"/>
+              <a:t>assembly</a:t>
+            </a:r>
+            <a:endParaRPr lang="en-US" dirty="0"/>
+          </a:p>
+        </p:txBody>
+      </p:sp>
+      <p:pic>
+        <p:nvPicPr>
+          <p:cNvPr id="4" name="Picture 3"/>
+          <p:cNvPicPr>
+            <a:picLocks noChangeAspect="1"/>
+          </p:cNvPicPr>
+          <p:nvPr/>
+        </p:nvPicPr>
+        <p:blipFill>
+          <a:blip r:embed="rId2"/>
+          <a:stretch>
+            <a:fillRect/>
+          </a:stretch>
+        </p:blipFill>
+        <p:spPr>
+          <a:xfrm>
+            <a:off x="880322" y="1459077"/>
+            <a:ext cx="3148990" cy="2391265"/>
+          </a:xfrm>
+          <a:prstGeom prst="rect">
+            <a:avLst/>
+          </a:prstGeom>
+        </p:spPr>
+      </p:pic>
+      <p:pic>
+        <p:nvPicPr>
+          <p:cNvPr id="9" name="Picture 8"/>
+          <p:cNvPicPr>
+            <a:picLocks noChangeAspect="1"/>
+          </p:cNvPicPr>
+          <p:nvPr/>
+        </p:nvPicPr>
+        <p:blipFill>
+          <a:blip r:embed="rId3"/>
+          <a:stretch>
+            <a:fillRect/>
+          </a:stretch>
+        </p:blipFill>
+        <p:spPr>
+          <a:xfrm>
+            <a:off x="5553283" y="1459079"/>
+            <a:ext cx="2134462" cy="2391264"/>
+          </a:xfrm>
+          <a:prstGeom prst="rect">
+            <a:avLst/>
+          </a:prstGeom>
+        </p:spPr>
+      </p:pic>
+      <p:pic>
+        <p:nvPicPr>
+          <p:cNvPr id="10" name="Picture 9"/>
+          <p:cNvPicPr>
+            <a:picLocks noChangeAspect="1"/>
+          </p:cNvPicPr>
+          <p:nvPr/>
+        </p:nvPicPr>
+        <p:blipFill>
+          <a:blip r:embed="rId4"/>
+          <a:stretch>
+            <a:fillRect/>
+          </a:stretch>
+        </p:blipFill>
+        <p:spPr>
+          <a:xfrm>
+            <a:off x="880322" y="4316541"/>
+            <a:ext cx="3148990" cy="1938597"/>
+          </a:xfrm>
+          <a:prstGeom prst="rect">
+            <a:avLst/>
+          </a:prstGeom>
+        </p:spPr>
+      </p:pic>
+      <p:pic>
+        <p:nvPicPr>
+          <p:cNvPr id="11" name="Picture 10"/>
+          <p:cNvPicPr>
+            <a:picLocks noChangeAspect="1"/>
+          </p:cNvPicPr>
+          <p:nvPr/>
+        </p:nvPicPr>
+        <p:blipFill>
+          <a:blip r:embed="rId5"/>
+          <a:stretch>
+            <a:fillRect/>
+          </a:stretch>
+        </p:blipFill>
+        <p:spPr>
+          <a:xfrm>
+            <a:off x="5358370" y="4316540"/>
+            <a:ext cx="2389657" cy="1938597"/>
+          </a:xfrm>
+          <a:prstGeom prst="rect">
+            <a:avLst/>
+          </a:prstGeom>
+        </p:spPr>
+      </p:pic>
+      <p:sp>
+        <p:nvSpPr>
+          <p:cNvPr id="12" name="TextBox 11"/>
+          <p:cNvSpPr txBox="1"/>
+          <p:nvPr/>
+        </p:nvSpPr>
+        <p:spPr>
+          <a:xfrm>
+            <a:off x="1945676" y="1089747"/>
+            <a:ext cx="766143" cy="369332"/>
+          </a:xfrm>
+          <a:prstGeom prst="rect">
+            <a:avLst/>
+          </a:prstGeom>
+          <a:noFill/>
+        </p:spPr>
+        <p:txBody>
+          <a:bodyPr wrap="none" rtlCol="0">
+            <a:spAutoFit/>
+          </a:bodyPr>
+          <a:lstStyle/>
+          <a:p>
+            <a:r>
+              <a:rPr lang="en-US" dirty="0" smtClean="0"/>
+              <a:t>Turtle</a:t>
+            </a:r>
+            <a:endParaRPr lang="en-US" dirty="0"/>
+          </a:p>
+        </p:txBody>
+      </p:sp>
+      <p:sp>
+        <p:nvSpPr>
+          <p:cNvPr id="13" name="TextBox 12"/>
+          <p:cNvSpPr txBox="1"/>
+          <p:nvPr/>
+        </p:nvSpPr>
+        <p:spPr>
+          <a:xfrm>
+            <a:off x="6309934" y="1089747"/>
+            <a:ext cx="659155" cy="369332"/>
+          </a:xfrm>
+          <a:prstGeom prst="rect">
+            <a:avLst/>
+          </a:prstGeom>
+          <a:noFill/>
+        </p:spPr>
+        <p:txBody>
+          <a:bodyPr wrap="none" rtlCol="0">
+            <a:spAutoFit/>
+          </a:bodyPr>
+          <a:lstStyle/>
+          <a:p>
+            <a:r>
+              <a:rPr lang="en-US" dirty="0" smtClean="0"/>
+              <a:t>Wolf</a:t>
+            </a:r>
+            <a:endParaRPr lang="en-US" dirty="0"/>
+          </a:p>
+        </p:txBody>
+      </p:sp>
+      <p:sp>
+        <p:nvSpPr>
+          <p:cNvPr id="14" name="TextBox 13"/>
+          <p:cNvSpPr txBox="1"/>
+          <p:nvPr/>
+        </p:nvSpPr>
+        <p:spPr>
+          <a:xfrm>
+            <a:off x="1945676" y="6259591"/>
+            <a:ext cx="787783" cy="369332"/>
+          </a:xfrm>
+          <a:prstGeom prst="rect">
+            <a:avLst/>
+          </a:prstGeom>
+          <a:noFill/>
+        </p:spPr>
+        <p:txBody>
+          <a:bodyPr wrap="none" rtlCol="0">
+            <a:spAutoFit/>
+          </a:bodyPr>
+          <a:lstStyle/>
+          <a:p>
+            <a:r>
+              <a:rPr lang="en-US" dirty="0" smtClean="0"/>
+              <a:t>Rhino</a:t>
+            </a:r>
+            <a:endParaRPr lang="en-US" dirty="0"/>
+          </a:p>
+        </p:txBody>
+      </p:sp>
+      <p:sp>
+        <p:nvSpPr>
+          <p:cNvPr id="15" name="TextBox 14"/>
+          <p:cNvSpPr txBox="1"/>
+          <p:nvPr/>
+        </p:nvSpPr>
+        <p:spPr>
+          <a:xfrm>
+            <a:off x="6056740" y="6259591"/>
+            <a:ext cx="992918" cy="369332"/>
+          </a:xfrm>
+          <a:prstGeom prst="rect">
+            <a:avLst/>
+          </a:prstGeom>
+          <a:noFill/>
+        </p:spPr>
+        <p:txBody>
+          <a:bodyPr wrap="none" rtlCol="0">
+            <a:spAutoFit/>
+          </a:bodyPr>
+          <a:lstStyle/>
+          <a:p>
+            <a:r>
+              <a:rPr lang="en-US" dirty="0" smtClean="0"/>
+              <a:t>Rooster</a:t>
+            </a:r>
+            <a:endParaRPr lang="en-US" dirty="0"/>
+          </a:p>
+        </p:txBody>
+      </p:sp>
+    </p:spTree>
+    <p:extLst>
+      <p:ext uri="{BB962C8B-B14F-4D97-AF65-F5344CB8AC3E}">
+        <p14:creationId xmlns:p14="http://schemas.microsoft.com/office/powerpoint/2010/main" val="533258287"/>
       </p:ext>
     </p:extLst>
   </p:cSld>

</xml_diff>